<commit_message>
Finished first draft of chapter 6
</commit_message>
<xml_diff>
--- a/Figures/GenericShow.pptx
+++ b/Figures/GenericShow.pptx
@@ -288,7 +288,7 @@
           <a:p>
             <a:fld id="{47B9A199-D001-9B4E-B758-14EC809AFE55}" type="datetimeFigureOut">
               <a:rPr lang="da-DK" smtClean="0"/>
-              <a:t>11/08/14</a:t>
+              <a:t>25/08/14</a:t>
             </a:fld>
             <a:endParaRPr lang="en-GB"/>
           </a:p>
@@ -458,7 +458,7 @@
           <a:p>
             <a:fld id="{47B9A199-D001-9B4E-B758-14EC809AFE55}" type="datetimeFigureOut">
               <a:rPr lang="da-DK" smtClean="0"/>
-              <a:t>11/08/14</a:t>
+              <a:t>25/08/14</a:t>
             </a:fld>
             <a:endParaRPr lang="en-GB"/>
           </a:p>
@@ -638,7 +638,7 @@
           <a:p>
             <a:fld id="{47B9A199-D001-9B4E-B758-14EC809AFE55}" type="datetimeFigureOut">
               <a:rPr lang="da-DK" smtClean="0"/>
-              <a:t>11/08/14</a:t>
+              <a:t>25/08/14</a:t>
             </a:fld>
             <a:endParaRPr lang="en-GB"/>
           </a:p>
@@ -808,7 +808,7 @@
           <a:p>
             <a:fld id="{47B9A199-D001-9B4E-B758-14EC809AFE55}" type="datetimeFigureOut">
               <a:rPr lang="da-DK" smtClean="0"/>
-              <a:t>11/08/14</a:t>
+              <a:t>25/08/14</a:t>
             </a:fld>
             <a:endParaRPr lang="en-GB"/>
           </a:p>
@@ -1054,7 +1054,7 @@
           <a:p>
             <a:fld id="{47B9A199-D001-9B4E-B758-14EC809AFE55}" type="datetimeFigureOut">
               <a:rPr lang="da-DK" smtClean="0"/>
-              <a:t>11/08/14</a:t>
+              <a:t>25/08/14</a:t>
             </a:fld>
             <a:endParaRPr lang="en-GB"/>
           </a:p>
@@ -1342,7 +1342,7 @@
           <a:p>
             <a:fld id="{47B9A199-D001-9B4E-B758-14EC809AFE55}" type="datetimeFigureOut">
               <a:rPr lang="da-DK" smtClean="0"/>
-              <a:t>11/08/14</a:t>
+              <a:t>25/08/14</a:t>
             </a:fld>
             <a:endParaRPr lang="en-GB"/>
           </a:p>
@@ -1764,7 +1764,7 @@
           <a:p>
             <a:fld id="{47B9A199-D001-9B4E-B758-14EC809AFE55}" type="datetimeFigureOut">
               <a:rPr lang="da-DK" smtClean="0"/>
-              <a:t>11/08/14</a:t>
+              <a:t>25/08/14</a:t>
             </a:fld>
             <a:endParaRPr lang="en-GB"/>
           </a:p>
@@ -1882,7 +1882,7 @@
           <a:p>
             <a:fld id="{47B9A199-D001-9B4E-B758-14EC809AFE55}" type="datetimeFigureOut">
               <a:rPr lang="da-DK" smtClean="0"/>
-              <a:t>11/08/14</a:t>
+              <a:t>25/08/14</a:t>
             </a:fld>
             <a:endParaRPr lang="en-GB"/>
           </a:p>
@@ -1977,7 +1977,7 @@
           <a:p>
             <a:fld id="{47B9A199-D001-9B4E-B758-14EC809AFE55}" type="datetimeFigureOut">
               <a:rPr lang="da-DK" smtClean="0"/>
-              <a:t>11/08/14</a:t>
+              <a:t>25/08/14</a:t>
             </a:fld>
             <a:endParaRPr lang="en-GB"/>
           </a:p>
@@ -2254,7 +2254,7 @@
           <a:p>
             <a:fld id="{47B9A199-D001-9B4E-B758-14EC809AFE55}" type="datetimeFigureOut">
               <a:rPr lang="da-DK" smtClean="0"/>
-              <a:t>11/08/14</a:t>
+              <a:t>25/08/14</a:t>
             </a:fld>
             <a:endParaRPr lang="en-GB"/>
           </a:p>
@@ -2507,7 +2507,7 @@
           <a:p>
             <a:fld id="{47B9A199-D001-9B4E-B758-14EC809AFE55}" type="datetimeFigureOut">
               <a:rPr lang="da-DK" smtClean="0"/>
-              <a:t>11/08/14</a:t>
+              <a:t>25/08/14</a:t>
             </a:fld>
             <a:endParaRPr lang="en-GB"/>
           </a:p>
@@ -2720,7 +2720,7 @@
           <a:p>
             <a:fld id="{47B9A199-D001-9B4E-B758-14EC809AFE55}" type="datetimeFigureOut">
               <a:rPr lang="da-DK" smtClean="0"/>
-              <a:t>11/08/14</a:t>
+              <a:t>25/08/14</a:t>
             </a:fld>
             <a:endParaRPr lang="en-GB"/>
           </a:p>
@@ -3138,14 +3138,14 @@
               <a:t> </a:t>
             </a:r>
             <a:r>
-              <a:rPr lang="fr-FR" dirty="0">
+              <a:rPr lang="fr-FR" dirty="0" smtClean="0">
                 <a:latin typeface="Lucida Console"/>
                 <a:cs typeface="Lucida Console"/>
               </a:rPr>
               <a:t>: (</a:t>
             </a:r>
             <a:r>
-              <a:rPr lang="fr-FR" dirty="0">
+              <a:rPr lang="fr-FR" dirty="0" smtClean="0">
                 <a:solidFill>
                   <a:schemeClr val="accent2">
                     <a:lumMod val="40000"/>
@@ -3158,14 +3158,14 @@
               <a:t>d</a:t>
             </a:r>
             <a:r>
-              <a:rPr lang="fr-FR" dirty="0">
+              <a:rPr lang="fr-FR" dirty="0" smtClean="0">
                 <a:latin typeface="Lucida Console"/>
                 <a:cs typeface="Lucida Console"/>
               </a:rPr>
               <a:t> : </a:t>
             </a:r>
             <a:r>
-              <a:rPr lang="fr-FR" dirty="0" err="1">
+              <a:rPr lang="fr-FR" dirty="0" err="1" smtClean="0">
                 <a:solidFill>
                   <a:srgbClr val="C0504D"/>
                 </a:solidFill>
@@ -3175,7 +3175,7 @@
               <a:t>TaggedDesc</a:t>
             </a:r>
             <a:r>
-              <a:rPr lang="fr-FR" dirty="0">
+              <a:rPr lang="fr-FR" dirty="0" smtClean="0">
                 <a:solidFill>
                   <a:srgbClr val="C0504D"/>
                 </a:solidFill>
@@ -3192,36 +3192,39 @@
                 <a:latin typeface="Lucida Console"/>
                 <a:cs typeface="Lucida Console"/>
               </a:rPr>
-              <a:t>e </a:t>
-            </a:r>
-            <a:r>
-              <a:rPr lang="fr-FR" dirty="0">
+              <a:t>e ix</a:t>
+            </a:r>
+            <a:r>
+              <a:rPr lang="fr-FR" dirty="0" smtClean="0">
+                <a:latin typeface="Lucida Console"/>
+                <a:cs typeface="Lucida Console"/>
+              </a:rPr>
+              <a:t>) -&gt;</a:t>
+            </a:r>
+          </a:p>
+          <a:p>
+            <a:r>
+              <a:rPr lang="fr-FR" dirty="0" smtClean="0">
+                <a:latin typeface="Lucida Console"/>
+                <a:cs typeface="Lucida Console"/>
+              </a:rPr>
+              <a:t>        (</a:t>
+            </a:r>
+            <a:r>
+              <a:rPr lang="fr-FR" dirty="0" err="1" smtClean="0">
                 <a:solidFill>
                   <a:srgbClr val="E6B9B8"/>
                 </a:solidFill>
                 <a:latin typeface="Lucida Console"/>
                 <a:cs typeface="Lucida Console"/>
               </a:rPr>
-              <a:t>ix</a:t>
-            </a:r>
-            <a:r>
-              <a:rPr lang="fr-FR" dirty="0">
-                <a:latin typeface="Lucida Console"/>
-                <a:cs typeface="Lucida Console"/>
-              </a:rPr>
-              <a:t>) -</a:t>
+              <a:t>constraints</a:t>
             </a:r>
             <a:r>
               <a:rPr lang="fr-FR" dirty="0" smtClean="0">
-                <a:latin typeface="Lucida Console"/>
-                <a:cs typeface="Lucida Console"/>
-              </a:rPr>
-              <a:t>&gt;</a:t>
-            </a:r>
-          </a:p>
-          <a:p>
-            <a:r>
-              <a:rPr lang="fr-FR" dirty="0">
+                <a:solidFill>
+                  <a:srgbClr val="E6B9B8"/>
+                </a:solidFill>
                 <a:latin typeface="Lucida Console"/>
                 <a:cs typeface="Lucida Console"/>
               </a:rPr>
@@ -3232,61 +3235,27 @@
                 <a:latin typeface="Lucida Console"/>
                 <a:cs typeface="Lucida Console"/>
               </a:rPr>
-              <a:t>       </a:t>
-            </a:r>
-            <a:r>
-              <a:rPr lang="fr-FR" dirty="0">
-                <a:latin typeface="Lucida Console"/>
-                <a:cs typeface="Lucida Console"/>
-              </a:rPr>
-              <a:t>(</a:t>
-            </a:r>
-            <a:r>
-              <a:rPr lang="fr-FR" dirty="0" err="1">
-                <a:solidFill>
-                  <a:srgbClr val="E6B9B8"/>
-                </a:solidFill>
-                <a:latin typeface="Lucida Console"/>
-                <a:cs typeface="Lucida Console"/>
-              </a:rPr>
-              <a:t>constraints</a:t>
-            </a:r>
-            <a:r>
-              <a:rPr lang="fr-FR" dirty="0">
-                <a:solidFill>
-                  <a:srgbClr val="E6B9B8"/>
-                </a:solidFill>
+              <a:t>: </a:t>
+            </a:r>
+            <a:r>
+              <a:rPr lang="fr-FR" dirty="0" smtClean="0">
+                <a:solidFill>
+                  <a:srgbClr val="C0504D"/>
+                </a:solidFill>
+                <a:latin typeface="Lucida Console"/>
+                <a:cs typeface="Lucida Console"/>
+              </a:rPr>
+              <a:t>Constraints1</a:t>
+            </a:r>
+            <a:r>
+              <a:rPr lang="fr-FR" dirty="0" smtClean="0">
                 <a:latin typeface="Lucida Console"/>
                 <a:cs typeface="Lucida Console"/>
               </a:rPr>
               <a:t> </a:t>
             </a:r>
             <a:r>
-              <a:rPr lang="fr-FR" dirty="0">
-                <a:latin typeface="Lucida Console"/>
-                <a:cs typeface="Lucida Console"/>
-              </a:rPr>
-              <a:t>: </a:t>
-            </a:r>
-            <a:r>
-              <a:rPr lang="fr-FR" dirty="0">
-                <a:solidFill>
-                  <a:srgbClr val="C0504D"/>
-                </a:solidFill>
-                <a:latin typeface="Lucida Console"/>
-                <a:cs typeface="Lucida Console"/>
-              </a:rPr>
-              <a:t>Constraints1</a:t>
-            </a:r>
-            <a:r>
-              <a:rPr lang="fr-FR" dirty="0">
-                <a:latin typeface="Lucida Console"/>
-                <a:cs typeface="Lucida Console"/>
-              </a:rPr>
-              <a:t> </a:t>
-            </a:r>
-            <a:r>
-              <a:rPr lang="fr-FR" dirty="0">
+              <a:rPr lang="fr-FR" dirty="0" smtClean="0">
                 <a:solidFill>
                   <a:schemeClr val="tx2">
                     <a:lumMod val="40000"/>
@@ -3299,27 +3268,244 @@
               <a:t>Show</a:t>
             </a:r>
             <a:r>
+              <a:rPr lang="fr-FR" dirty="0" smtClean="0">
+                <a:latin typeface="Lucida Console"/>
+                <a:cs typeface="Lucida Console"/>
+              </a:rPr>
+              <a:t> (</a:t>
+            </a:r>
+            <a:r>
+              <a:rPr lang="fr-FR" dirty="0" err="1" smtClean="0">
+                <a:solidFill>
+                  <a:srgbClr val="C0504D"/>
+                </a:solidFill>
+                <a:latin typeface="Lucida Console"/>
+                <a:cs typeface="Lucida Console"/>
+              </a:rPr>
+              <a:t>Untag</a:t>
+            </a:r>
+            <a:r>
+              <a:rPr lang="fr-FR" dirty="0" smtClean="0">
+                <a:solidFill>
+                  <a:srgbClr val="C0504D"/>
+                </a:solidFill>
+                <a:latin typeface="Lucida Console"/>
+                <a:cs typeface="Lucida Console"/>
+              </a:rPr>
+              <a:t> </a:t>
+            </a:r>
+            <a:r>
+              <a:rPr lang="fr-FR" dirty="0" smtClean="0">
+                <a:solidFill>
+                  <a:srgbClr val="E6B9B8"/>
+                </a:solidFill>
+                <a:latin typeface="Lucida Console"/>
+                <a:cs typeface="Lucida Console"/>
+              </a:rPr>
+              <a:t>d</a:t>
+            </a:r>
+            <a:r>
+              <a:rPr lang="fr-FR" dirty="0" smtClean="0">
+                <a:latin typeface="Lucida Console"/>
+                <a:cs typeface="Lucida Console"/>
+              </a:rPr>
+              <a:t>)) -&gt; </a:t>
+            </a:r>
+          </a:p>
+          <a:p>
+            <a:r>
+              <a:rPr lang="fr-FR" dirty="0" smtClean="0">
+                <a:latin typeface="Lucida Console"/>
+                <a:cs typeface="Lucida Console"/>
+              </a:rPr>
+              <a:t>        {</a:t>
+            </a:r>
+            <a:r>
+              <a:rPr lang="fr-FR" dirty="0" smtClean="0">
+                <a:solidFill>
+                  <a:schemeClr val="accent2">
+                    <a:lumMod val="40000"/>
+                    <a:lumOff val="60000"/>
+                  </a:schemeClr>
+                </a:solidFill>
+                <a:latin typeface="Lucida Console"/>
+                <a:cs typeface="Lucida Console"/>
+              </a:rPr>
+              <a:t>i</a:t>
+            </a:r>
+            <a:r>
+              <a:rPr lang="fr-FR" dirty="0" smtClean="0">
+                <a:latin typeface="Lucida Console"/>
+                <a:cs typeface="Lucida Console"/>
+              </a:rPr>
+              <a:t> : </a:t>
+            </a:r>
+            <a:r>
+              <a:rPr lang="fr-FR" dirty="0" smtClean="0">
+                <a:solidFill>
+                  <a:srgbClr val="E6B9B8"/>
+                </a:solidFill>
+                <a:latin typeface="Lucida Console"/>
+                <a:cs typeface="Lucida Console"/>
+              </a:rPr>
+              <a:t>ix</a:t>
+            </a:r>
+            <a:r>
+              <a:rPr lang="fr-FR" dirty="0" smtClean="0">
+                <a:latin typeface="Lucida Console"/>
+                <a:cs typeface="Lucida Console"/>
+              </a:rPr>
+              <a:t>} -&gt; (</a:t>
+            </a:r>
+            <a:r>
+              <a:rPr lang="fr-FR" dirty="0" smtClean="0">
+                <a:solidFill>
+                  <a:srgbClr val="E6B9B8"/>
+                </a:solidFill>
+                <a:latin typeface="Lucida Console"/>
+                <a:cs typeface="Lucida Console"/>
+              </a:rPr>
+              <a:t>x</a:t>
+            </a:r>
+            <a:r>
+              <a:rPr lang="fr-FR" dirty="0" smtClean="0">
+                <a:latin typeface="Lucida Console"/>
+                <a:cs typeface="Lucida Console"/>
+              </a:rPr>
+              <a:t> : </a:t>
+            </a:r>
+            <a:r>
+              <a:rPr lang="fr-FR" dirty="0" err="1" smtClean="0">
+                <a:solidFill>
+                  <a:srgbClr val="C0504D"/>
+                </a:solidFill>
+                <a:latin typeface="Lucida Console"/>
+                <a:cs typeface="Lucida Console"/>
+              </a:rPr>
+              <a:t>TData</a:t>
+            </a:r>
+            <a:r>
+              <a:rPr lang="fr-FR" dirty="0" smtClean="0">
+                <a:solidFill>
+                  <a:srgbClr val="C0504D"/>
+                </a:solidFill>
+                <a:latin typeface="Lucida Console"/>
+                <a:cs typeface="Lucida Console"/>
+              </a:rPr>
+              <a:t> </a:t>
+            </a:r>
+            <a:r>
+              <a:rPr lang="fr-FR" dirty="0" smtClean="0">
+                <a:solidFill>
+                  <a:srgbClr val="E6B9B8"/>
+                </a:solidFill>
+                <a:latin typeface="Lucida Console"/>
+                <a:cs typeface="Lucida Console"/>
+              </a:rPr>
+              <a:t>d i</a:t>
+            </a:r>
+            <a:r>
+              <a:rPr lang="fr-FR" dirty="0" smtClean="0">
+                <a:latin typeface="Lucida Console"/>
+                <a:cs typeface="Lucida Console"/>
+              </a:rPr>
+              <a:t>) -&gt; </a:t>
+            </a:r>
+            <a:r>
+              <a:rPr lang="fr-FR" dirty="0" smtClean="0">
+                <a:solidFill>
+                  <a:schemeClr val="accent1"/>
+                </a:solidFill>
+                <a:latin typeface="Lucida Console"/>
+                <a:cs typeface="Lucida Console"/>
+              </a:rPr>
+              <a:t>String</a:t>
+            </a:r>
+          </a:p>
+          <a:p>
+            <a:r>
+              <a:rPr lang="fr-FR" dirty="0" err="1" smtClean="0">
+                <a:solidFill>
+                  <a:srgbClr val="C0504D"/>
+                </a:solidFill>
+                <a:latin typeface="Lucida Console"/>
+                <a:cs typeface="Lucida Console"/>
+              </a:rPr>
+              <a:t>gshow</a:t>
+            </a:r>
+            <a:r>
+              <a:rPr lang="fr-FR" dirty="0" smtClean="0">
+                <a:solidFill>
+                  <a:srgbClr val="C0504D"/>
+                </a:solidFill>
+                <a:latin typeface="Lucida Console"/>
+                <a:cs typeface="Lucida Console"/>
+              </a:rPr>
+              <a:t> </a:t>
+            </a:r>
+            <a:r>
               <a:rPr lang="fr-FR" dirty="0">
+                <a:solidFill>
+                  <a:srgbClr val="E6B9B8"/>
+                </a:solidFill>
+                <a:latin typeface="Lucida Console"/>
+                <a:cs typeface="Lucida Console"/>
+              </a:rPr>
+              <a:t>d</a:t>
+            </a:r>
+            <a:r>
+              <a:rPr lang="fr-FR" dirty="0">
                 <a:latin typeface="Lucida Console"/>
                 <a:cs typeface="Lucida Console"/>
               </a:rPr>
               <a:t> (</a:t>
             </a:r>
             <a:r>
+              <a:rPr lang="fr-FR" dirty="0">
+                <a:solidFill>
+                  <a:srgbClr val="E6B9B8"/>
+                </a:solidFill>
+                <a:latin typeface="Lucida Console"/>
+                <a:cs typeface="Lucida Console"/>
+              </a:rPr>
+              <a:t>l</a:t>
+            </a:r>
+            <a:r>
+              <a:rPr lang="fr-FR" dirty="0">
+                <a:latin typeface="Lucida Console"/>
+                <a:cs typeface="Lucida Console"/>
+              </a:rPr>
+              <a:t>, </a:t>
+            </a:r>
+            <a:r>
               <a:rPr lang="fr-FR" dirty="0" err="1">
                 <a:solidFill>
-                  <a:srgbClr val="C0504D"/>
-                </a:solidFill>
-                <a:latin typeface="Lucida Console"/>
-                <a:cs typeface="Lucida Console"/>
-              </a:rPr>
-              <a:t>Untag</a:t>
+                  <a:srgbClr val="E6B9B8"/>
+                </a:solidFill>
+                <a:latin typeface="Lucida Console"/>
+                <a:cs typeface="Lucida Console"/>
+              </a:rPr>
+              <a:t>constraints</a:t>
             </a:r>
             <a:r>
               <a:rPr lang="fr-FR" dirty="0">
-                <a:solidFill>
-                  <a:srgbClr val="C0504D"/>
-                </a:solidFill>
+                <a:latin typeface="Lucida Console"/>
+                <a:cs typeface="Lucida Console"/>
+              </a:rPr>
+              <a:t>) (</a:t>
+            </a:r>
+            <a:r>
+              <a:rPr lang="fr-FR" dirty="0">
+                <a:solidFill>
+                  <a:schemeClr val="accent3"/>
+                </a:solidFill>
+                <a:latin typeface="Lucida Console"/>
+                <a:cs typeface="Lucida Console"/>
+              </a:rPr>
+              <a:t>Con</a:t>
+            </a:r>
+            <a:r>
+              <a:rPr lang="fr-FR" dirty="0">
                 <a:latin typeface="Lucida Console"/>
                 <a:cs typeface="Lucida Console"/>
               </a:rPr>
@@ -3328,33 +3514,280 @@
             <a:r>
               <a:rPr lang="fr-FR" dirty="0">
                 <a:solidFill>
+                  <a:srgbClr val="9BBB59"/>
+                </a:solidFill>
+                <a:latin typeface="Lucida Console"/>
+                <a:cs typeface="Lucida Console"/>
+              </a:rPr>
+              <a:t>(</a:t>
+            </a:r>
+            <a:r>
+              <a:rPr lang="fr-FR" dirty="0">
+                <a:solidFill>
                   <a:srgbClr val="E6B9B8"/>
                 </a:solidFill>
                 <a:latin typeface="Lucida Console"/>
                 <a:cs typeface="Lucida Console"/>
               </a:rPr>
-              <a:t>d</a:t>
+              <a:t>label</a:t>
             </a:r>
             <a:r>
               <a:rPr lang="fr-FR" dirty="0">
                 <a:latin typeface="Lucida Console"/>
                 <a:cs typeface="Lucida Console"/>
               </a:rPr>
-              <a:t>)) </a:t>
-            </a:r>
-            <a:r>
-              <a:rPr lang="fr-FR" dirty="0" smtClean="0">
-                <a:latin typeface="Lucida Console"/>
-                <a:cs typeface="Lucida Console"/>
-              </a:rPr>
-              <a:t>-</a:t>
+              <a:t> </a:t>
             </a:r>
             <a:r>
               <a:rPr lang="fr-FR" dirty="0">
-                <a:latin typeface="Lucida Console"/>
-                <a:cs typeface="Lucida Console"/>
-              </a:rPr>
-              <a:t>&gt; </a:t>
+                <a:solidFill>
+                  <a:srgbClr val="9BBB59"/>
+                </a:solidFill>
+                <a:latin typeface="Lucida Console"/>
+                <a:cs typeface="Lucida Console"/>
+              </a:rPr>
+              <a:t>** (</a:t>
+            </a:r>
+            <a:r>
+              <a:rPr lang="fr-FR" dirty="0">
+                <a:solidFill>
+                  <a:srgbClr val="E6B9B8"/>
+                </a:solidFill>
+                <a:latin typeface="Lucida Console"/>
+                <a:cs typeface="Lucida Console"/>
+              </a:rPr>
+              <a:t>tag</a:t>
+            </a:r>
+            <a:r>
+              <a:rPr lang="fr-FR" dirty="0">
+                <a:latin typeface="Lucida Console"/>
+                <a:cs typeface="Lucida Console"/>
+              </a:rPr>
+              <a:t> </a:t>
+            </a:r>
+            <a:r>
+              <a:rPr lang="fr-FR" dirty="0">
+                <a:solidFill>
+                  <a:srgbClr val="9BBB59"/>
+                </a:solidFill>
+                <a:latin typeface="Lucida Console"/>
+                <a:cs typeface="Lucida Console"/>
+              </a:rPr>
+              <a:t>**</a:t>
+            </a:r>
+            <a:r>
+              <a:rPr lang="fr-FR" dirty="0">
+                <a:latin typeface="Lucida Console"/>
+                <a:cs typeface="Lucida Console"/>
+              </a:rPr>
+              <a:t> </a:t>
+            </a:r>
+            <a:r>
+              <a:rPr lang="fr-FR" dirty="0" err="1">
+                <a:solidFill>
+                  <a:srgbClr val="E6B9B8"/>
+                </a:solidFill>
+                <a:latin typeface="Lucida Console"/>
+                <a:cs typeface="Lucida Console"/>
+              </a:rPr>
+              <a:t>rest</a:t>
+            </a:r>
+            <a:r>
+              <a:rPr lang="fr-FR" dirty="0">
+                <a:solidFill>
+                  <a:srgbClr val="9BBB59"/>
+                </a:solidFill>
+                <a:latin typeface="Lucida Console"/>
+                <a:cs typeface="Lucida Console"/>
+              </a:rPr>
+              <a:t>))</a:t>
+            </a:r>
+            <a:r>
+              <a:rPr lang="fr-FR" dirty="0">
+                <a:latin typeface="Lucida Console"/>
+                <a:cs typeface="Lucida Console"/>
+              </a:rPr>
+              <a:t>) =</a:t>
+            </a:r>
+          </a:p>
+          <a:p>
+            <a:r>
+              <a:rPr lang="fr-FR" dirty="0">
+                <a:latin typeface="Lucida Console"/>
+                <a:cs typeface="Lucida Console"/>
+              </a:rPr>
+              <a:t>     </a:t>
+            </a:r>
+            <a:r>
+              <a:rPr lang="fr-FR" b="1" dirty="0">
+                <a:latin typeface="Lucida Console"/>
+                <a:cs typeface="Lucida Console"/>
+              </a:rPr>
+              <a:t>let</a:t>
+            </a:r>
+            <a:r>
+              <a:rPr lang="fr-FR" dirty="0">
+                <a:latin typeface="Lucida Console"/>
+                <a:cs typeface="Lucida Console"/>
+              </a:rPr>
+              <a:t> </a:t>
+            </a:r>
+            <a:r>
+              <a:rPr lang="fr-FR" dirty="0">
+                <a:solidFill>
+                  <a:srgbClr val="9BBB59"/>
+                </a:solidFill>
+                <a:latin typeface="Lucida Console"/>
+                <a:cs typeface="Lucida Console"/>
+              </a:rPr>
+              <a:t>(</a:t>
+            </a:r>
+            <a:r>
+              <a:rPr lang="fr-FR" dirty="0" err="1">
+                <a:solidFill>
+                  <a:srgbClr val="E6B9B8"/>
+                </a:solidFill>
+                <a:latin typeface="Lucida Console"/>
+                <a:cs typeface="Lucida Console"/>
+              </a:rPr>
+              <a:t>t</a:t>
+            </a:r>
+            <a:r>
+              <a:rPr lang="fr-FR" dirty="0">
+                <a:solidFill>
+                  <a:srgbClr val="9BBB59"/>
+                </a:solidFill>
+                <a:latin typeface="Lucida Console"/>
+                <a:cs typeface="Lucida Console"/>
+              </a:rPr>
+              <a:t>,</a:t>
+            </a:r>
+            <a:r>
+              <a:rPr lang="fr-FR" dirty="0">
+                <a:latin typeface="Lucida Console"/>
+                <a:cs typeface="Lucida Console"/>
+              </a:rPr>
+              <a:t> </a:t>
+            </a:r>
+            <a:r>
+              <a:rPr lang="fr-FR" dirty="0" err="1">
+                <a:solidFill>
+                  <a:srgbClr val="E6B9B8"/>
+                </a:solidFill>
+                <a:latin typeface="Lucida Console"/>
+                <a:cs typeface="Lucida Console"/>
+              </a:rPr>
+              <a:t>constraints</a:t>
+            </a:r>
+            <a:r>
+              <a:rPr lang="fr-FR" dirty="0">
+                <a:solidFill>
+                  <a:srgbClr val="E6B9B8"/>
+                </a:solidFill>
+                <a:latin typeface="Lucida Console"/>
+                <a:cs typeface="Lucida Console"/>
+              </a:rPr>
+              <a:t>'</a:t>
+            </a:r>
+            <a:r>
+              <a:rPr lang="fr-FR" dirty="0">
+                <a:solidFill>
+                  <a:srgbClr val="9BBB59"/>
+                </a:solidFill>
+                <a:latin typeface="Lucida Console"/>
+                <a:cs typeface="Lucida Console"/>
+              </a:rPr>
+              <a:t>)</a:t>
+            </a:r>
+            <a:r>
+              <a:rPr lang="fr-FR" dirty="0">
+                <a:latin typeface="Lucida Console"/>
+                <a:cs typeface="Lucida Console"/>
+              </a:rPr>
+              <a:t> = (</a:t>
+            </a:r>
+            <a:r>
+              <a:rPr lang="fr-FR" dirty="0" err="1">
+                <a:solidFill>
+                  <a:schemeClr val="accent2">
+                    <a:lumMod val="40000"/>
+                    <a:lumOff val="60000"/>
+                  </a:schemeClr>
+                </a:solidFill>
+                <a:latin typeface="Lucida Console"/>
+                <a:cs typeface="Lucida Console"/>
+              </a:rPr>
+              <a:t>constraints</a:t>
+            </a:r>
+            <a:r>
+              <a:rPr lang="fr-FR" dirty="0">
+                <a:solidFill>
+                  <a:schemeClr val="accent2">
+                    <a:lumMod val="40000"/>
+                    <a:lumOff val="60000"/>
+                  </a:schemeClr>
+                </a:solidFill>
+                <a:latin typeface="Lucida Console"/>
+                <a:cs typeface="Lucida Console"/>
+              </a:rPr>
+              <a:t> </a:t>
+            </a:r>
+            <a:r>
+              <a:rPr lang="fr-FR" dirty="0">
+                <a:solidFill>
+                  <a:srgbClr val="E6B9B8"/>
+                </a:solidFill>
+                <a:latin typeface="Lucida Console"/>
+                <a:cs typeface="Lucida Console"/>
+              </a:rPr>
+              <a:t>label</a:t>
+            </a:r>
+            <a:r>
+              <a:rPr lang="fr-FR" dirty="0">
+                <a:latin typeface="Lucida Console"/>
+                <a:cs typeface="Lucida Console"/>
+              </a:rPr>
+              <a:t>)</a:t>
+            </a:r>
+          </a:p>
+          <a:p>
+            <a:r>
+              <a:rPr lang="fr-FR" dirty="0">
+                <a:latin typeface="Lucida Console"/>
+                <a:cs typeface="Lucida Console"/>
+              </a:rPr>
+              <a:t>     </a:t>
+            </a:r>
+            <a:r>
+              <a:rPr lang="fr-FR" b="1" dirty="0">
+                <a:latin typeface="Lucida Console"/>
+                <a:cs typeface="Lucida Console"/>
+              </a:rPr>
+              <a:t>in</a:t>
+            </a:r>
+            <a:r>
+              <a:rPr lang="fr-FR" dirty="0">
+                <a:latin typeface="Lucida Console"/>
+                <a:cs typeface="Lucida Console"/>
+              </a:rPr>
+              <a:t> </a:t>
+            </a:r>
+            <a:r>
+              <a:rPr lang="fr-FR" dirty="0">
+                <a:solidFill>
+                  <a:srgbClr val="E6B9B8"/>
+                </a:solidFill>
+                <a:latin typeface="Lucida Console"/>
+                <a:cs typeface="Lucida Console"/>
+              </a:rPr>
+              <a:t>label</a:t>
+            </a:r>
+            <a:r>
+              <a:rPr lang="fr-FR" dirty="0">
+                <a:latin typeface="Lucida Console"/>
+                <a:cs typeface="Lucida Console"/>
+              </a:rPr>
+              <a:t> ++ </a:t>
             </a:r>
             <a:endParaRPr lang="fr-FR" dirty="0" smtClean="0">
               <a:latin typeface="Lucida Console"/>
@@ -3363,660 +3796,167 @@
           </a:p>
           <a:p>
             <a:r>
+              <a:rPr lang="fr-FR" dirty="0" smtClean="0">
+                <a:latin typeface="Lucida Console"/>
+                <a:cs typeface="Lucida Console"/>
+              </a:rPr>
+              <a:t>          (</a:t>
+            </a:r>
+            <a:r>
+              <a:rPr lang="fr-FR" b="1" dirty="0" err="1" smtClean="0">
+                <a:latin typeface="Lucida Console"/>
+                <a:cs typeface="Lucida Console"/>
+              </a:rPr>
+              <a:t>assert_total</a:t>
+            </a:r>
+            <a:r>
+              <a:rPr lang="fr-FR" dirty="0" smtClean="0">
+                <a:latin typeface="Lucida Console"/>
+                <a:cs typeface="Lucida Console"/>
+              </a:rPr>
+              <a:t> $ </a:t>
+            </a:r>
+            <a:r>
+              <a:rPr lang="fr-FR" dirty="0" err="1" smtClean="0">
+                <a:solidFill>
+                  <a:schemeClr val="accent2"/>
+                </a:solidFill>
+                <a:latin typeface="Lucida Console"/>
+                <a:cs typeface="Lucida Console"/>
+              </a:rPr>
+              <a:t>gshowd</a:t>
+            </a:r>
+            <a:r>
+              <a:rPr lang="fr-FR" dirty="0" smtClean="0">
+                <a:solidFill>
+                  <a:schemeClr val="accent2"/>
+                </a:solidFill>
+                <a:latin typeface="Lucida Console"/>
+                <a:cs typeface="Lucida Console"/>
+              </a:rPr>
+              <a:t> </a:t>
+            </a:r>
+            <a:r>
+              <a:rPr lang="fr-FR" dirty="0" smtClean="0">
+                <a:solidFill>
+                  <a:srgbClr val="E6B9B8"/>
+                </a:solidFill>
+                <a:latin typeface="Lucida Console"/>
+                <a:cs typeface="Lucida Console"/>
+              </a:rPr>
+              <a:t>d</a:t>
+            </a:r>
+            <a:r>
+              <a:rPr lang="fr-FR" dirty="0" smtClean="0">
+                <a:latin typeface="Lucida Console"/>
+                <a:cs typeface="Lucida Console"/>
+              </a:rPr>
+              <a:t> (</a:t>
+            </a:r>
+            <a:r>
+              <a:rPr lang="fr-FR" dirty="0" smtClean="0">
+                <a:solidFill>
+                  <a:srgbClr val="E6B9B8"/>
+                </a:solidFill>
+                <a:latin typeface="Lucida Console"/>
+                <a:cs typeface="Lucida Console"/>
+              </a:rPr>
+              <a:t>l</a:t>
+            </a:r>
+            <a:r>
+              <a:rPr lang="fr-FR" dirty="0" smtClean="0">
+                <a:latin typeface="Lucida Console"/>
+                <a:cs typeface="Lucida Console"/>
+              </a:rPr>
+              <a:t>, </a:t>
+            </a:r>
+            <a:r>
+              <a:rPr lang="fr-FR" dirty="0" err="1" smtClean="0">
+                <a:solidFill>
+                  <a:srgbClr val="E6B9B8"/>
+                </a:solidFill>
+                <a:latin typeface="Lucida Console"/>
+                <a:cs typeface="Lucida Console"/>
+              </a:rPr>
+              <a:t>constraints</a:t>
+            </a:r>
+            <a:r>
+              <a:rPr lang="fr-FR" dirty="0" smtClean="0">
+                <a:latin typeface="Lucida Console"/>
+                <a:cs typeface="Lucida Console"/>
+              </a:rPr>
+              <a:t>) </a:t>
+            </a:r>
+          </a:p>
+          <a:p>
+            <a:r>
+              <a:rPr lang="fr-FR" dirty="0" smtClean="0">
+                <a:latin typeface="Lucida Console"/>
+                <a:cs typeface="Lucida Console"/>
+              </a:rPr>
+              <a:t>                     (</a:t>
+            </a:r>
+            <a:r>
               <a:rPr lang="fr-FR" dirty="0">
-                <a:latin typeface="Lucida Console"/>
-                <a:cs typeface="Lucida Console"/>
-              </a:rPr>
-              <a:t> </a:t>
-            </a:r>
-            <a:r>
-              <a:rPr lang="fr-FR" dirty="0" smtClean="0">
-                <a:latin typeface="Lucida Console"/>
-                <a:cs typeface="Lucida Console"/>
-              </a:rPr>
-              <a:t>       {</a:t>
+                <a:solidFill>
+                  <a:srgbClr val="E6B9B8"/>
+                </a:solidFill>
+                <a:latin typeface="Lucida Console"/>
+                <a:cs typeface="Lucida Console"/>
+              </a:rPr>
+              <a:t>d label tag</a:t>
             </a:r>
             <a:r>
               <a:rPr lang="fr-FR" dirty="0">
-                <a:solidFill>
-                  <a:schemeClr val="accent2">
-                    <a:lumMod val="40000"/>
-                    <a:lumOff val="60000"/>
-                  </a:schemeClr>
-                </a:solidFill>
-                <a:latin typeface="Lucida Console"/>
-                <a:cs typeface="Lucida Console"/>
-              </a:rPr>
-              <a:t>i</a:t>
+                <a:latin typeface="Lucida Console"/>
+                <a:cs typeface="Lucida Console"/>
+              </a:rPr>
+              <a:t>) (</a:t>
+            </a:r>
+            <a:r>
+              <a:rPr lang="fr-FR" dirty="0" err="1">
+                <a:solidFill>
+                  <a:srgbClr val="E6B9B8"/>
+                </a:solidFill>
+                <a:latin typeface="Lucida Console"/>
+                <a:cs typeface="Lucida Console"/>
+              </a:rPr>
+              <a:t>constraints</a:t>
             </a:r>
             <a:r>
               <a:rPr lang="fr-FR" dirty="0">
-                <a:latin typeface="Lucida Console"/>
-                <a:cs typeface="Lucida Console"/>
-              </a:rPr>
-              <a:t> : </a:t>
+                <a:solidFill>
+                  <a:srgbClr val="E6B9B8"/>
+                </a:solidFill>
+                <a:latin typeface="Lucida Console"/>
+                <a:cs typeface="Lucida Console"/>
+              </a:rPr>
+              <a:t>' tag</a:t>
             </a:r>
             <a:r>
               <a:rPr lang="fr-FR" dirty="0">
+                <a:latin typeface="Lucida Console"/>
+                <a:cs typeface="Lucida Console"/>
+              </a:rPr>
+              <a:t>) </a:t>
+            </a:r>
+            <a:r>
+              <a:rPr lang="fr-FR" dirty="0" err="1">
                 <a:solidFill>
                   <a:srgbClr val="E6B9B8"/>
                 </a:solidFill>
                 <a:latin typeface="Lucida Console"/>
                 <a:cs typeface="Lucida Console"/>
               </a:rPr>
-              <a:t>ix</a:t>
+              <a:t>rest</a:t>
             </a:r>
             <a:r>
               <a:rPr lang="fr-FR" dirty="0">
                 <a:latin typeface="Lucida Console"/>
                 <a:cs typeface="Lucida Console"/>
               </a:rPr>
-              <a:t>} -&gt; (</a:t>
-            </a:r>
-            <a:r>
-              <a:rPr lang="fr-FR" dirty="0">
-                <a:solidFill>
-                  <a:srgbClr val="E6B9B8"/>
-                </a:solidFill>
-                <a:latin typeface="Lucida Console"/>
-                <a:cs typeface="Lucida Console"/>
-              </a:rPr>
-              <a:t>x</a:t>
-            </a:r>
-            <a:r>
-              <a:rPr lang="fr-FR" dirty="0">
-                <a:latin typeface="Lucida Console"/>
-                <a:cs typeface="Lucida Console"/>
-              </a:rPr>
-              <a:t> : </a:t>
-            </a:r>
-            <a:r>
-              <a:rPr lang="fr-FR" dirty="0" err="1" smtClean="0">
-                <a:solidFill>
-                  <a:srgbClr val="C0504D"/>
-                </a:solidFill>
-                <a:latin typeface="Lucida Console"/>
-                <a:cs typeface="Lucida Console"/>
-              </a:rPr>
-              <a:t>TData</a:t>
-            </a:r>
-            <a:r>
-              <a:rPr lang="fr-FR" dirty="0" smtClean="0">
-                <a:solidFill>
-                  <a:srgbClr val="C0504D"/>
-                </a:solidFill>
-                <a:latin typeface="Lucida Console"/>
-                <a:cs typeface="Lucida Console"/>
-              </a:rPr>
-              <a:t> </a:t>
-            </a:r>
-            <a:r>
-              <a:rPr lang="fr-FR" dirty="0">
-                <a:solidFill>
-                  <a:srgbClr val="E6B9B8"/>
-                </a:solidFill>
-                <a:latin typeface="Lucida Console"/>
-                <a:cs typeface="Lucida Console"/>
-              </a:rPr>
-              <a:t>d i</a:t>
-            </a:r>
-            <a:r>
-              <a:rPr lang="fr-FR" dirty="0">
-                <a:latin typeface="Lucida Console"/>
-                <a:cs typeface="Lucida Console"/>
-              </a:rPr>
-              <a:t>) -&gt; </a:t>
-            </a:r>
-            <a:r>
-              <a:rPr lang="fr-FR" dirty="0">
-                <a:solidFill>
-                  <a:schemeClr val="accent1"/>
-                </a:solidFill>
-                <a:latin typeface="Lucida Console"/>
-                <a:cs typeface="Lucida Console"/>
-              </a:rPr>
-              <a:t>String</a:t>
-            </a:r>
-          </a:p>
-          <a:p>
-            <a:r>
-              <a:rPr lang="fr-FR" dirty="0" err="1" smtClean="0">
-                <a:solidFill>
-                  <a:srgbClr val="C0504D"/>
-                </a:solidFill>
-                <a:latin typeface="Lucida Console"/>
-                <a:cs typeface="Lucida Console"/>
-              </a:rPr>
-              <a:t>gshow</a:t>
-            </a:r>
-            <a:r>
-              <a:rPr lang="fr-FR" dirty="0" smtClean="0">
-                <a:solidFill>
-                  <a:srgbClr val="C0504D"/>
-                </a:solidFill>
-                <a:latin typeface="Lucida Console"/>
-                <a:cs typeface="Lucida Console"/>
-              </a:rPr>
-              <a:t> </a:t>
-            </a:r>
-            <a:r>
-              <a:rPr lang="fr-FR" dirty="0">
-                <a:solidFill>
-                  <a:srgbClr val="E6B9B8"/>
-                </a:solidFill>
-                <a:latin typeface="Lucida Console"/>
-                <a:cs typeface="Lucida Console"/>
-              </a:rPr>
-              <a:t>d</a:t>
-            </a:r>
-            <a:r>
-              <a:rPr lang="fr-FR" dirty="0">
-                <a:latin typeface="Lucida Console"/>
-                <a:cs typeface="Lucida Console"/>
-              </a:rPr>
-              <a:t> (</a:t>
-            </a:r>
-            <a:r>
-              <a:rPr lang="fr-FR" dirty="0">
-                <a:solidFill>
-                  <a:srgbClr val="E6B9B8"/>
-                </a:solidFill>
-                <a:latin typeface="Lucida Console"/>
-                <a:cs typeface="Lucida Console"/>
-              </a:rPr>
-              <a:t>l</a:t>
-            </a:r>
-            <a:r>
-              <a:rPr lang="fr-FR" dirty="0">
-                <a:latin typeface="Lucida Console"/>
-                <a:cs typeface="Lucida Console"/>
-              </a:rPr>
-              <a:t>, </a:t>
-            </a:r>
-            <a:r>
-              <a:rPr lang="fr-FR" dirty="0" err="1">
-                <a:solidFill>
-                  <a:srgbClr val="E6B9B8"/>
-                </a:solidFill>
-                <a:latin typeface="Lucida Console"/>
-                <a:cs typeface="Lucida Console"/>
-              </a:rPr>
-              <a:t>constraints</a:t>
-            </a:r>
-            <a:r>
-              <a:rPr lang="fr-FR" dirty="0">
-                <a:latin typeface="Lucida Console"/>
-                <a:cs typeface="Lucida Console"/>
-              </a:rPr>
-              <a:t>) (</a:t>
-            </a:r>
-            <a:r>
-              <a:rPr lang="fr-FR" dirty="0">
-                <a:solidFill>
-                  <a:schemeClr val="accent3"/>
-                </a:solidFill>
-                <a:latin typeface="Lucida Console"/>
-                <a:cs typeface="Lucida Console"/>
-              </a:rPr>
-              <a:t>Con</a:t>
-            </a:r>
-            <a:r>
-              <a:rPr lang="fr-FR" dirty="0">
-                <a:latin typeface="Lucida Console"/>
-                <a:cs typeface="Lucida Console"/>
-              </a:rPr>
-              <a:t> </a:t>
-            </a:r>
-            <a:r>
-              <a:rPr lang="fr-FR" dirty="0">
-                <a:solidFill>
-                  <a:srgbClr val="9BBB59"/>
-                </a:solidFill>
-                <a:latin typeface="Lucida Console"/>
-                <a:cs typeface="Lucida Console"/>
-              </a:rPr>
-              <a:t>(</a:t>
-            </a:r>
-            <a:r>
-              <a:rPr lang="fr-FR" dirty="0">
-                <a:solidFill>
-                  <a:srgbClr val="E6B9B8"/>
-                </a:solidFill>
-                <a:latin typeface="Lucida Console"/>
-                <a:cs typeface="Lucida Console"/>
-              </a:rPr>
-              <a:t>label</a:t>
-            </a:r>
-            <a:r>
-              <a:rPr lang="fr-FR" dirty="0">
-                <a:latin typeface="Lucida Console"/>
-                <a:cs typeface="Lucida Console"/>
-              </a:rPr>
-              <a:t> </a:t>
-            </a:r>
-            <a:r>
-              <a:rPr lang="fr-FR" dirty="0">
-                <a:solidFill>
-                  <a:srgbClr val="9BBB59"/>
-                </a:solidFill>
-                <a:latin typeface="Lucida Console"/>
-                <a:cs typeface="Lucida Console"/>
-              </a:rPr>
-              <a:t>** (</a:t>
-            </a:r>
-            <a:r>
-              <a:rPr lang="fr-FR" dirty="0">
-                <a:solidFill>
-                  <a:srgbClr val="E6B9B8"/>
-                </a:solidFill>
-                <a:latin typeface="Lucida Console"/>
-                <a:cs typeface="Lucida Console"/>
-              </a:rPr>
-              <a:t>tag</a:t>
-            </a:r>
-            <a:r>
-              <a:rPr lang="fr-FR" dirty="0">
-                <a:latin typeface="Lucida Console"/>
-                <a:cs typeface="Lucida Console"/>
-              </a:rPr>
-              <a:t> </a:t>
-            </a:r>
-            <a:r>
-              <a:rPr lang="fr-FR" dirty="0">
-                <a:solidFill>
-                  <a:srgbClr val="9BBB59"/>
-                </a:solidFill>
-                <a:latin typeface="Lucida Console"/>
-                <a:cs typeface="Lucida Console"/>
-              </a:rPr>
-              <a:t>**</a:t>
-            </a:r>
-            <a:r>
-              <a:rPr lang="fr-FR" dirty="0">
-                <a:latin typeface="Lucida Console"/>
-                <a:cs typeface="Lucida Console"/>
-              </a:rPr>
-              <a:t> </a:t>
-            </a:r>
-            <a:r>
-              <a:rPr lang="fr-FR" dirty="0" err="1">
-                <a:solidFill>
-                  <a:srgbClr val="E6B9B8"/>
-                </a:solidFill>
-                <a:latin typeface="Lucida Console"/>
-                <a:cs typeface="Lucida Console"/>
-              </a:rPr>
-              <a:t>rest</a:t>
-            </a:r>
-            <a:r>
-              <a:rPr lang="fr-FR" dirty="0">
-                <a:solidFill>
-                  <a:srgbClr val="9BBB59"/>
-                </a:solidFill>
-                <a:latin typeface="Lucida Console"/>
-                <a:cs typeface="Lucida Console"/>
-              </a:rPr>
-              <a:t>))</a:t>
-            </a:r>
-            <a:r>
-              <a:rPr lang="fr-FR" dirty="0">
-                <a:latin typeface="Lucida Console"/>
-                <a:cs typeface="Lucida Console"/>
-              </a:rPr>
-              <a:t>) =</a:t>
-            </a:r>
-          </a:p>
-          <a:p>
-            <a:r>
-              <a:rPr lang="fr-FR" dirty="0">
-                <a:latin typeface="Lucida Console"/>
-                <a:cs typeface="Lucida Console"/>
-              </a:rPr>
-              <a:t>     </a:t>
-            </a:r>
-            <a:r>
-              <a:rPr lang="fr-FR" b="1" dirty="0">
-                <a:latin typeface="Lucida Console"/>
-                <a:cs typeface="Lucida Console"/>
-              </a:rPr>
-              <a:t>let</a:t>
-            </a:r>
-            <a:r>
-              <a:rPr lang="fr-FR" dirty="0">
-                <a:latin typeface="Lucida Console"/>
-                <a:cs typeface="Lucida Console"/>
-              </a:rPr>
-              <a:t> </a:t>
-            </a:r>
-            <a:r>
-              <a:rPr lang="fr-FR" dirty="0">
-                <a:solidFill>
-                  <a:srgbClr val="9BBB59"/>
-                </a:solidFill>
-                <a:latin typeface="Lucida Console"/>
-                <a:cs typeface="Lucida Console"/>
-              </a:rPr>
-              <a:t>(</a:t>
-            </a:r>
-            <a:r>
-              <a:rPr lang="fr-FR" dirty="0" err="1">
-                <a:solidFill>
-                  <a:srgbClr val="E6B9B8"/>
-                </a:solidFill>
-                <a:latin typeface="Lucida Console"/>
-                <a:cs typeface="Lucida Console"/>
-              </a:rPr>
-              <a:t>t</a:t>
-            </a:r>
-            <a:r>
-              <a:rPr lang="fr-FR" dirty="0">
-                <a:solidFill>
-                  <a:srgbClr val="9BBB59"/>
-                </a:solidFill>
-                <a:latin typeface="Lucida Console"/>
-                <a:cs typeface="Lucida Console"/>
-              </a:rPr>
-              <a:t>,</a:t>
-            </a:r>
-            <a:r>
-              <a:rPr lang="fr-FR" dirty="0">
-                <a:latin typeface="Lucida Console"/>
-                <a:cs typeface="Lucida Console"/>
-              </a:rPr>
-              <a:t> </a:t>
-            </a:r>
-            <a:r>
-              <a:rPr lang="fr-FR" dirty="0" err="1">
-                <a:solidFill>
-                  <a:srgbClr val="E6B9B8"/>
-                </a:solidFill>
-                <a:latin typeface="Lucida Console"/>
-                <a:cs typeface="Lucida Console"/>
-              </a:rPr>
-              <a:t>constraints</a:t>
-            </a:r>
-            <a:r>
-              <a:rPr lang="fr-FR" dirty="0">
-                <a:solidFill>
-                  <a:srgbClr val="E6B9B8"/>
-                </a:solidFill>
-                <a:latin typeface="Lucida Console"/>
-                <a:cs typeface="Lucida Console"/>
-              </a:rPr>
-              <a:t>'</a:t>
-            </a:r>
-            <a:r>
-              <a:rPr lang="fr-FR" dirty="0">
-                <a:solidFill>
-                  <a:srgbClr val="9BBB59"/>
-                </a:solidFill>
-                <a:latin typeface="Lucida Console"/>
-                <a:cs typeface="Lucida Console"/>
-              </a:rPr>
               <a:t>)</a:t>
             </a:r>
-            <a:r>
-              <a:rPr lang="fr-FR" dirty="0">
-                <a:latin typeface="Lucida Console"/>
-                <a:cs typeface="Lucida Console"/>
-              </a:rPr>
-              <a:t> = (</a:t>
-            </a:r>
-            <a:r>
-              <a:rPr lang="fr-FR" dirty="0" err="1">
-                <a:solidFill>
-                  <a:schemeClr val="accent2">
-                    <a:lumMod val="40000"/>
-                    <a:lumOff val="60000"/>
-                  </a:schemeClr>
-                </a:solidFill>
-                <a:latin typeface="Lucida Console"/>
-                <a:cs typeface="Lucida Console"/>
-              </a:rPr>
-              <a:t>constraints</a:t>
-            </a:r>
-            <a:r>
-              <a:rPr lang="fr-FR" dirty="0">
-                <a:solidFill>
-                  <a:schemeClr val="accent2">
-                    <a:lumMod val="40000"/>
-                    <a:lumOff val="60000"/>
-                  </a:schemeClr>
-                </a:solidFill>
-                <a:latin typeface="Lucida Console"/>
-                <a:cs typeface="Lucida Console"/>
-              </a:rPr>
-              <a:t> </a:t>
-            </a:r>
-            <a:r>
-              <a:rPr lang="fr-FR" dirty="0">
-                <a:solidFill>
-                  <a:srgbClr val="E6B9B8"/>
-                </a:solidFill>
-                <a:latin typeface="Lucida Console"/>
-                <a:cs typeface="Lucida Console"/>
-              </a:rPr>
-              <a:t>label</a:t>
-            </a:r>
-            <a:r>
-              <a:rPr lang="fr-FR" dirty="0">
-                <a:latin typeface="Lucida Console"/>
-                <a:cs typeface="Lucida Console"/>
-              </a:rPr>
-              <a:t>)</a:t>
-            </a:r>
-          </a:p>
-          <a:p>
-            <a:r>
-              <a:rPr lang="fr-FR" dirty="0">
-                <a:latin typeface="Lucida Console"/>
-                <a:cs typeface="Lucida Console"/>
-              </a:rPr>
-              <a:t>     </a:t>
-            </a:r>
-            <a:r>
-              <a:rPr lang="fr-FR" b="1" dirty="0">
-                <a:latin typeface="Lucida Console"/>
-                <a:cs typeface="Lucida Console"/>
-              </a:rPr>
-              <a:t>in</a:t>
-            </a:r>
-            <a:r>
-              <a:rPr lang="fr-FR" dirty="0">
-                <a:latin typeface="Lucida Console"/>
-                <a:cs typeface="Lucida Console"/>
-              </a:rPr>
-              <a:t> </a:t>
-            </a:r>
-            <a:r>
-              <a:rPr lang="fr-FR" dirty="0">
-                <a:solidFill>
-                  <a:srgbClr val="E6B9B8"/>
-                </a:solidFill>
-                <a:latin typeface="Lucida Console"/>
-                <a:cs typeface="Lucida Console"/>
-              </a:rPr>
-              <a:t>label</a:t>
-            </a:r>
-            <a:r>
-              <a:rPr lang="fr-FR" dirty="0">
-                <a:latin typeface="Lucida Console"/>
-                <a:cs typeface="Lucida Console"/>
-              </a:rPr>
-              <a:t> ++ </a:t>
-            </a:r>
-            <a:endParaRPr lang="fr-FR" dirty="0" smtClean="0">
-              <a:latin typeface="Lucida Console"/>
-              <a:cs typeface="Lucida Console"/>
-            </a:endParaRPr>
-          </a:p>
-          <a:p>
-            <a:r>
-              <a:rPr lang="fr-FR" dirty="0" smtClean="0">
-                <a:latin typeface="Lucida Console"/>
-                <a:cs typeface="Lucida Console"/>
-              </a:rPr>
-              <a:t>          (</a:t>
-            </a:r>
-            <a:r>
-              <a:rPr lang="fr-FR" b="1" dirty="0" err="1" smtClean="0">
-                <a:latin typeface="Lucida Console"/>
-                <a:cs typeface="Lucida Console"/>
-              </a:rPr>
-              <a:t>assert_total</a:t>
-            </a:r>
-            <a:r>
-              <a:rPr lang="fr-FR" dirty="0" smtClean="0">
-                <a:latin typeface="Lucida Console"/>
-                <a:cs typeface="Lucida Console"/>
-              </a:rPr>
-              <a:t> $ </a:t>
-            </a:r>
-            <a:r>
-              <a:rPr lang="fr-FR" dirty="0" err="1" smtClean="0">
-                <a:solidFill>
-                  <a:schemeClr val="accent2"/>
-                </a:solidFill>
-                <a:latin typeface="Lucida Console"/>
-                <a:cs typeface="Lucida Console"/>
-              </a:rPr>
-              <a:t>gshowd</a:t>
-            </a:r>
-            <a:r>
-              <a:rPr lang="fr-FR" dirty="0" smtClean="0">
-                <a:solidFill>
-                  <a:schemeClr val="accent2"/>
-                </a:solidFill>
-                <a:latin typeface="Lucida Console"/>
-                <a:cs typeface="Lucida Console"/>
-              </a:rPr>
-              <a:t> </a:t>
-            </a:r>
-            <a:r>
-              <a:rPr lang="fr-FR" dirty="0" smtClean="0">
-                <a:solidFill>
-                  <a:srgbClr val="E6B9B8"/>
-                </a:solidFill>
-                <a:latin typeface="Lucida Console"/>
-                <a:cs typeface="Lucida Console"/>
-              </a:rPr>
-              <a:t>d</a:t>
-            </a:r>
-            <a:r>
-              <a:rPr lang="fr-FR" dirty="0" smtClean="0">
-                <a:latin typeface="Lucida Console"/>
-                <a:cs typeface="Lucida Console"/>
-              </a:rPr>
-              <a:t> (</a:t>
-            </a:r>
-            <a:r>
-              <a:rPr lang="fr-FR" dirty="0" smtClean="0">
-                <a:solidFill>
-                  <a:srgbClr val="E6B9B8"/>
-                </a:solidFill>
-                <a:latin typeface="Lucida Console"/>
-                <a:cs typeface="Lucida Console"/>
-              </a:rPr>
-              <a:t>l</a:t>
-            </a:r>
-            <a:r>
-              <a:rPr lang="fr-FR" dirty="0" smtClean="0">
-                <a:latin typeface="Lucida Console"/>
-                <a:cs typeface="Lucida Console"/>
-              </a:rPr>
-              <a:t>, </a:t>
-            </a:r>
-            <a:r>
-              <a:rPr lang="fr-FR" dirty="0" err="1" smtClean="0">
-                <a:solidFill>
-                  <a:srgbClr val="E6B9B8"/>
-                </a:solidFill>
-                <a:latin typeface="Lucida Console"/>
-                <a:cs typeface="Lucida Console"/>
-              </a:rPr>
-              <a:t>constraints</a:t>
-            </a:r>
-            <a:r>
-              <a:rPr lang="fr-FR" dirty="0" smtClean="0">
-                <a:latin typeface="Lucida Console"/>
-                <a:cs typeface="Lucida Console"/>
-              </a:rPr>
-              <a:t>) </a:t>
-            </a:r>
-          </a:p>
-          <a:p>
-            <a:r>
-              <a:rPr lang="fr-FR" dirty="0" smtClean="0">
-                <a:latin typeface="Lucida Console"/>
-                <a:cs typeface="Lucida Console"/>
-              </a:rPr>
-              <a:t>                     (</a:t>
-            </a:r>
-            <a:r>
-              <a:rPr lang="fr-FR" dirty="0">
-                <a:solidFill>
-                  <a:srgbClr val="E6B9B8"/>
-                </a:solidFill>
-                <a:latin typeface="Lucida Console"/>
-                <a:cs typeface="Lucida Console"/>
-              </a:rPr>
-              <a:t>d label tag</a:t>
-            </a:r>
-            <a:r>
-              <a:rPr lang="fr-FR" dirty="0">
-                <a:latin typeface="Lucida Console"/>
-                <a:cs typeface="Lucida Console"/>
-              </a:rPr>
-              <a:t>) (</a:t>
-            </a:r>
-            <a:r>
-              <a:rPr lang="fr-FR" dirty="0" err="1">
-                <a:solidFill>
-                  <a:srgbClr val="E6B9B8"/>
-                </a:solidFill>
-                <a:latin typeface="Lucida Console"/>
-                <a:cs typeface="Lucida Console"/>
-              </a:rPr>
-              <a:t>constraints</a:t>
-            </a:r>
-            <a:r>
-              <a:rPr lang="fr-FR" dirty="0">
-                <a:solidFill>
-                  <a:srgbClr val="E6B9B8"/>
-                </a:solidFill>
-                <a:latin typeface="Lucida Console"/>
-                <a:cs typeface="Lucida Console"/>
-              </a:rPr>
-              <a:t>' tag</a:t>
-            </a:r>
-            <a:r>
-              <a:rPr lang="fr-FR" dirty="0">
-                <a:latin typeface="Lucida Console"/>
-                <a:cs typeface="Lucida Console"/>
-              </a:rPr>
-              <a:t>) </a:t>
-            </a:r>
-            <a:r>
-              <a:rPr lang="fr-FR" dirty="0" err="1">
-                <a:solidFill>
-                  <a:srgbClr val="E6B9B8"/>
-                </a:solidFill>
-                <a:latin typeface="Lucida Console"/>
-                <a:cs typeface="Lucida Console"/>
-              </a:rPr>
-              <a:t>rest</a:t>
-            </a:r>
-            <a:r>
-              <a:rPr lang="fr-FR" dirty="0">
-                <a:latin typeface="Lucida Console"/>
-                <a:cs typeface="Lucida Console"/>
-              </a:rPr>
-              <a:t>)</a:t>
-            </a:r>
-            <a:endParaRPr lang="fr-FR" dirty="0">
-              <a:latin typeface="Lucida Console"/>
-              <a:cs typeface="Lucida Console"/>
-            </a:endParaRPr>
           </a:p>
         </p:txBody>
       </p:sp>

</xml_diff>